<commit_message>
Add corrected ML model evaluation and final streamlit script
</commit_message>
<xml_diff>
--- a/SOCIAL MEDIA SENTIMENT.pptx
+++ b/SOCIAL MEDIA SENTIMENT.pptx
@@ -207,7 +207,7 @@
           <a:p>
             <a:fld id="{F612AE24-C245-4ABC-AFC6-41029EB392E7}" type="datetimeFigureOut">
               <a:rPr lang="en-US" smtClean="0"/>
-              <a:t>12/24/2025</a:t>
+              <a:t>12/25/2025</a:t>
             </a:fld>
             <a:endParaRPr lang="en-US"/>
           </a:p>
@@ -621,7 +621,7 @@
           <a:p>
             <a:fld id="{B2A7B5A7-81AF-46D9-9838-4DFF9316775F}" type="datetime1">
               <a:rPr lang="en-US" smtClean="0"/>
-              <a:t>12/24/2025</a:t>
+              <a:t>12/25/2025</a:t>
             </a:fld>
             <a:endParaRPr lang="en-US"/>
           </a:p>
@@ -819,7 +819,7 @@
           <a:p>
             <a:fld id="{AC3C0D4F-2177-4AAE-89DC-9886E011EE7A}" type="datetime1">
               <a:rPr lang="en-US" smtClean="0"/>
-              <a:t>12/24/2025</a:t>
+              <a:t>12/25/2025</a:t>
             </a:fld>
             <a:endParaRPr lang="en-US"/>
           </a:p>
@@ -1027,7 +1027,7 @@
           <a:p>
             <a:fld id="{668FF54E-D803-4475-A2AE-C25634B43B70}" type="datetime1">
               <a:rPr lang="en-US" smtClean="0"/>
-              <a:t>12/24/2025</a:t>
+              <a:t>12/25/2025</a:t>
             </a:fld>
             <a:endParaRPr lang="en-US"/>
           </a:p>
@@ -1225,7 +1225,7 @@
           <a:p>
             <a:fld id="{B640FEB1-33DD-48ED-997E-20845CF9FFC6}" type="datetime1">
               <a:rPr lang="en-US" smtClean="0"/>
-              <a:t>12/24/2025</a:t>
+              <a:t>12/25/2025</a:t>
             </a:fld>
             <a:endParaRPr lang="en-US"/>
           </a:p>
@@ -1500,7 +1500,7 @@
           <a:p>
             <a:fld id="{4D602266-5587-4FB8-8D57-D27D9A82539B}" type="datetime1">
               <a:rPr lang="en-US" smtClean="0"/>
-              <a:t>12/24/2025</a:t>
+              <a:t>12/25/2025</a:t>
             </a:fld>
             <a:endParaRPr lang="en-US"/>
           </a:p>
@@ -1765,7 +1765,7 @@
           <a:p>
             <a:fld id="{3E0308FB-BAA4-47A2-AB8E-18118210A89A}" type="datetime1">
               <a:rPr lang="en-US" smtClean="0"/>
-              <a:t>12/24/2025</a:t>
+              <a:t>12/25/2025</a:t>
             </a:fld>
             <a:endParaRPr lang="en-US"/>
           </a:p>
@@ -2177,7 +2177,7 @@
           <a:p>
             <a:fld id="{67895A3F-A4C2-4CE6-8391-53D70AC5436A}" type="datetime1">
               <a:rPr lang="en-US" smtClean="0"/>
-              <a:t>12/24/2025</a:t>
+              <a:t>12/25/2025</a:t>
             </a:fld>
             <a:endParaRPr lang="en-US"/>
           </a:p>
@@ -2318,7 +2318,7 @@
           <a:p>
             <a:fld id="{60E2E6A7-CF0F-45F6-9DDC-C4092F888977}" type="datetime1">
               <a:rPr lang="en-US" smtClean="0"/>
-              <a:t>12/24/2025</a:t>
+              <a:t>12/25/2025</a:t>
             </a:fld>
             <a:endParaRPr lang="en-US"/>
           </a:p>
@@ -2431,7 +2431,7 @@
           <a:p>
             <a:fld id="{B4842F3C-EB11-470E-9C51-12CE256CCF05}" type="datetime1">
               <a:rPr lang="en-US" smtClean="0"/>
-              <a:t>12/24/2025</a:t>
+              <a:t>12/25/2025</a:t>
             </a:fld>
             <a:endParaRPr lang="en-US"/>
           </a:p>
@@ -2742,7 +2742,7 @@
           <a:p>
             <a:fld id="{F2744F83-3428-46EE-AF6C-8296B5F6597A}" type="datetime1">
               <a:rPr lang="en-US" smtClean="0"/>
-              <a:t>12/24/2025</a:t>
+              <a:t>12/25/2025</a:t>
             </a:fld>
             <a:endParaRPr lang="en-US"/>
           </a:p>
@@ -3030,7 +3030,7 @@
           <a:p>
             <a:fld id="{02A6D52E-F050-41F9-A6DC-39C460C15D84}" type="datetime1">
               <a:rPr lang="en-US" smtClean="0"/>
-              <a:t>12/24/2025</a:t>
+              <a:t>12/25/2025</a:t>
             </a:fld>
             <a:endParaRPr lang="en-US"/>
           </a:p>
@@ -3271,7 +3271,7 @@
           <a:p>
             <a:fld id="{11288D89-6DE7-47AE-8EF8-BB01887588D3}" type="datetime1">
               <a:rPr lang="en-US" smtClean="0"/>
-              <a:t>12/24/2025</a:t>
+              <a:t>12/25/2025</a:t>
             </a:fld>
             <a:endParaRPr lang="en-US"/>
           </a:p>
@@ -4640,7 +4640,21 @@
                 <a:latin typeface="Times New Roman" panose="02020603050405020304" pitchFamily="18" charset="0"/>
                 <a:cs typeface="Times New Roman" panose="02020603050405020304" pitchFamily="18" charset="0"/>
               </a:rPr>
-              <a:t>Reddit (Structured):</a:t>
+              <a:t>Reddit (comments/posts) (</a:t>
+            </a:r>
+            <a:r>
+              <a:rPr lang="en-US" b="1" dirty="0" err="1">
+                <a:latin typeface="Times New Roman" panose="02020603050405020304" pitchFamily="18" charset="0"/>
+                <a:cs typeface="Times New Roman" panose="02020603050405020304" pitchFamily="18" charset="0"/>
+              </a:rPr>
+              <a:t>Semi_Structured</a:t>
+            </a:r>
+            <a:r>
+              <a:rPr lang="en-US" b="1" dirty="0">
+                <a:latin typeface="Times New Roman" panose="02020603050405020304" pitchFamily="18" charset="0"/>
+                <a:cs typeface="Times New Roman" panose="02020603050405020304" pitchFamily="18" charset="0"/>
+              </a:rPr>
+              <a:t>):</a:t>
             </a:r>
             <a:r>
               <a:rPr lang="en-US" dirty="0">
@@ -4668,11 +4682,18 @@
               </a:lnSpc>
             </a:pPr>
             <a:r>
+              <a:rPr lang="en-US" b="1" dirty="0" err="1">
+                <a:latin typeface="Times New Roman" panose="02020603050405020304" pitchFamily="18" charset="0"/>
+                <a:cs typeface="Times New Roman" panose="02020603050405020304" pitchFamily="18" charset="0"/>
+              </a:rPr>
+              <a:t>Twitte</a:t>
+            </a:r>
+            <a:r>
               <a:rPr lang="en-US" b="1" dirty="0">
                 <a:latin typeface="Times New Roman" panose="02020603050405020304" pitchFamily="18" charset="0"/>
                 <a:cs typeface="Times New Roman" panose="02020603050405020304" pitchFamily="18" charset="0"/>
               </a:rPr>
-              <a:t>Twitter (Semi-Structured):</a:t>
+              <a:t> (tweets/retweets) (Structured):</a:t>
             </a:r>
             <a:r>
               <a:rPr lang="en-US" dirty="0">
@@ -4972,7 +4993,7 @@
                 <a:latin typeface="Times New Roman" panose="02020603050405020304" pitchFamily="18" charset="0"/>
                 <a:cs typeface="Times New Roman" panose="02020603050405020304" pitchFamily="18" charset="0"/>
               </a:rPr>
-              <a:t>, cleaning, transformation)</a:t>
+              <a:t>, cleaning)</a:t>
             </a:r>
           </a:p>
           <a:p>
@@ -5018,7 +5039,7 @@
                 <a:latin typeface="Times New Roman" panose="02020603050405020304" pitchFamily="18" charset="0"/>
                 <a:cs typeface="Times New Roman" panose="02020603050405020304" pitchFamily="18" charset="0"/>
               </a:rPr>
-              <a:t>Pandas (Data manipulation for visualization)</a:t>
+              <a:t>Pandas (python library for data manipulation for visualization)</a:t>
             </a:r>
           </a:p>
           <a:p>
@@ -5438,13 +5459,6 @@
             <a:pPr algn="ctr"/>
             <a:r>
               <a:rPr lang="en-US" sz="1200" dirty="0"/>
-              <a:t>- Apache Spark</a:t>
-            </a:r>
-          </a:p>
-          <a:p>
-            <a:pPr algn="ctr"/>
-            <a:r>
-              <a:rPr lang="en-US" sz="1200" dirty="0"/>
               <a:t>- Store in HDFS</a:t>
             </a:r>
           </a:p>
@@ -6177,13 +6191,6 @@
             <a:pPr algn="ctr"/>
             <a:r>
               <a:rPr lang="en-US" sz="1100" dirty="0"/>
-              <a:t>- Convert to TF-IDF vectors</a:t>
-            </a:r>
-          </a:p>
-          <a:p>
-            <a:pPr algn="ctr"/>
-            <a:r>
-              <a:rPr lang="en-US" sz="1100" dirty="0"/>
               <a:t>- Generate sentiment labels: Positive, Negative, Neutral</a:t>
             </a:r>
           </a:p>
@@ -6335,7 +6342,7 @@
             <a:pPr algn="ctr"/>
             <a:r>
               <a:rPr lang="en-US" sz="1100" dirty="0"/>
-              <a:t>- Linear SVM</a:t>
+              <a:t>- Linear SVM(Support vector machine)</a:t>
             </a:r>
           </a:p>
           <a:p>
@@ -6482,7 +6489,7 @@
             <a:pPr algn="ctr"/>
             <a:r>
               <a:rPr lang="en-US" sz="1100" dirty="0"/>
-              <a:t>- Accuracy, F1-score</a:t>
+              <a:t>- Accuracy</a:t>
             </a:r>
           </a:p>
           <a:p>
@@ -6637,7 +6644,7 @@
             <a:pPr algn="ctr"/>
             <a:r>
               <a:rPr lang="en-US" sz="1100" dirty="0"/>
-              <a:t>- TF-IDF vectorizer &amp; trained SVM model</a:t>
+              <a:t>- SVM model</a:t>
             </a:r>
           </a:p>
           <a:p>
@@ -7214,7 +7221,7 @@
                 <a:latin typeface="Times New Roman" panose="02020603050405020304" pitchFamily="18" charset="0"/>
                 <a:cs typeface="Times New Roman" panose="02020603050405020304" pitchFamily="18" charset="0"/>
               </a:rPr>
-              <a:t>Key Performance Indicator): summarize key metrics</a:t>
+              <a:t>Key Performance Indicator)</a:t>
             </a:r>
             <a:endParaRPr lang="en-US" sz="4200" dirty="0">
               <a:latin typeface="Times New Roman" panose="02020603050405020304" pitchFamily="18" charset="0"/>
@@ -7624,7 +7631,7 @@
                 <a:latin typeface="Times New Roman" panose="02020603050405020304" pitchFamily="18" charset="0"/>
                 <a:cs typeface="Times New Roman" panose="02020603050405020304" pitchFamily="18" charset="0"/>
               </a:rPr>
-              <a:t>TF-IDF vectors from cleaned social media text</a:t>
+              <a:t>TF-IDF(helps a model pick important words and ignore common ones) vectors from cleaned social media text</a:t>
             </a:r>
           </a:p>
           <a:p>
@@ -7638,7 +7645,7 @@
                 <a:latin typeface="Times New Roman" panose="02020603050405020304" pitchFamily="18" charset="0"/>
                 <a:cs typeface="Times New Roman" panose="02020603050405020304" pitchFamily="18" charset="0"/>
               </a:rPr>
-              <a:t>Captures word importance relative to the corpus(Words that appear a lot in one post but rarely in other posts get higher importance)</a:t>
+              <a:t>Captures word importance relative to the dataset(Words that appear a lot in one post but rarely in other posts get higher importance)</a:t>
             </a:r>
           </a:p>
           <a:p>
@@ -7718,7 +7725,21 @@
                 <a:latin typeface="Times New Roman" panose="02020603050405020304" pitchFamily="18" charset="0"/>
                 <a:cs typeface="Times New Roman" panose="02020603050405020304" pitchFamily="18" charset="0"/>
               </a:rPr>
-              <a:t> Accuracy 92.32%</a:t>
+              <a:t> Accuracy 92.32% (for </a:t>
+            </a:r>
+            <a:r>
+              <a:rPr lang="en-US" sz="1800" dirty="0" err="1">
+                <a:latin typeface="Times New Roman" panose="02020603050405020304" pitchFamily="18" charset="0"/>
+                <a:cs typeface="Times New Roman" panose="02020603050405020304" pitchFamily="18" charset="0"/>
+              </a:rPr>
+              <a:t>finilize</a:t>
+            </a:r>
+            <a:r>
+              <a:rPr lang="en-US" sz="1800" dirty="0">
+                <a:latin typeface="Times New Roman" panose="02020603050405020304" pitchFamily="18" charset="0"/>
+                <a:cs typeface="Times New Roman" panose="02020603050405020304" pitchFamily="18" charset="0"/>
+              </a:rPr>
+              <a:t> ml pipeline)</a:t>
             </a:r>
           </a:p>
         </p:txBody>

</xml_diff>